<commit_message>
Finalized project demo re-do
</commit_message>
<xml_diff>
--- a/hw02/Data Mining Project 2.pptx
+++ b/hw02/Data Mining Project 2.pptx
@@ -9,10 +9,10 @@
     <p:sldId id="257" r:id="rId3"/>
     <p:sldId id="269" r:id="rId4"/>
     <p:sldId id="267" r:id="rId5"/>
-    <p:sldId id="270" r:id="rId6"/>
-    <p:sldId id="271" r:id="rId7"/>
-    <p:sldId id="272" r:id="rId8"/>
-    <p:sldId id="273" r:id="rId9"/>
+    <p:sldId id="271" r:id="rId6"/>
+    <p:sldId id="272" r:id="rId7"/>
+    <p:sldId id="273" r:id="rId8"/>
+    <p:sldId id="274" r:id="rId9"/>
   </p:sldIdLst>
   <p:sldSz cx="12192000" cy="6858000"/>
   <p:notesSz cx="6858000" cy="9144000"/>
@@ -113,7 +113,18 @@
   </p:defaultTextStyle>
   <p:extLst>
     <p:ext uri="{EFAFB233-063F-42B5-8137-9DF3F51BA10A}">
-      <p15:sldGuideLst xmlns="" xmlns:p15="http://schemas.microsoft.com/office/powerpoint/2012/main"/>
+      <p15:sldGuideLst xmlns:p15="http://schemas.microsoft.com/office/powerpoint/2012/main">
+        <p15:guide id="1" orient="horz" pos="2160">
+          <p15:clr>
+            <a:srgbClr val="A4A3A4"/>
+          </p15:clr>
+        </p15:guide>
+        <p15:guide id="2" pos="3840">
+          <p15:clr>
+            <a:srgbClr val="A4A3A4"/>
+          </p15:clr>
+        </p15:guide>
+      </p15:sldGuideLst>
     </p:ext>
   </p:extLst>
 </p:presentation>
@@ -302,7 +313,7 @@
           </a:lstStyle>
           <a:p>
             <a:r>
-              <a:rPr lang="en-US" smtClean="0"/>
+              <a:rPr lang="en-US"/>
               <a:t>Click to edit Master title style</a:t>
             </a:r>
             <a:endParaRPr lang="en-US" dirty="0"/>
@@ -369,7 +380,7 @@
           </a:lstStyle>
           <a:p>
             <a:r>
-              <a:rPr lang="en-US" smtClean="0"/>
+              <a:rPr lang="en-US"/>
               <a:t>Click to edit Master subtitle style</a:t>
             </a:r>
             <a:endParaRPr lang="en-US" dirty="0"/>
@@ -393,7 +404,7 @@
           <a:p>
             <a:fld id="{03953C3F-D36F-4B1A-A959-B36391D1B06D}" type="datetimeFigureOut">
               <a:rPr lang="en-US" smtClean="0"/>
-              <a:t>3/29/2016</a:t>
+              <a:t>3/30/2016</a:t>
             </a:fld>
             <a:endParaRPr lang="en-US" dirty="0"/>
           </a:p>
@@ -642,7 +653,7 @@
           </a:lstStyle>
           <a:p>
             <a:r>
-              <a:rPr lang="en-US" smtClean="0"/>
+              <a:rPr lang="en-US"/>
               <a:t>Click to edit Master title style</a:t>
             </a:r>
             <a:endParaRPr lang="en-US" dirty="0"/>
@@ -718,7 +729,7 @@
           </a:lstStyle>
           <a:p>
             <a:r>
-              <a:rPr lang="en-US" smtClean="0"/>
+              <a:rPr lang="en-US"/>
               <a:t>Click icon to add picture</a:t>
             </a:r>
             <a:endParaRPr lang="en-US" dirty="0"/>
@@ -784,7 +795,7 @@
           <a:p>
             <a:pPr lvl="0"/>
             <a:r>
-              <a:rPr lang="en-US" smtClean="0"/>
+              <a:rPr lang="en-US"/>
               <a:t>Click to edit Master text styles</a:t>
             </a:r>
           </a:p>
@@ -807,7 +818,7 @@
           <a:p>
             <a:fld id="{03953C3F-D36F-4B1A-A959-B36391D1B06D}" type="datetimeFigureOut">
               <a:rPr lang="en-US" smtClean="0"/>
-              <a:t>3/29/2016</a:t>
+              <a:t>3/30/2016</a:t>
             </a:fld>
             <a:endParaRPr lang="en-US" dirty="0"/>
           </a:p>
@@ -1054,7 +1065,7 @@
           </a:lstStyle>
           <a:p>
             <a:r>
-              <a:rPr lang="en-US" smtClean="0"/>
+              <a:rPr lang="en-US"/>
               <a:t>Click to edit Master title style</a:t>
             </a:r>
             <a:endParaRPr lang="en-US" dirty="0"/>
@@ -1120,7 +1131,7 @@
           <a:p>
             <a:pPr lvl="0"/>
             <a:r>
-              <a:rPr lang="en-US" smtClean="0"/>
+              <a:rPr lang="en-US"/>
               <a:t>Click to edit Master text styles</a:t>
             </a:r>
           </a:p>
@@ -1143,7 +1154,7 @@
           <a:p>
             <a:fld id="{03953C3F-D36F-4B1A-A959-B36391D1B06D}" type="datetimeFigureOut">
               <a:rPr lang="en-US" smtClean="0"/>
-              <a:t>3/29/2016</a:t>
+              <a:t>3/30/2016</a:t>
             </a:fld>
             <a:endParaRPr lang="en-US" dirty="0"/>
           </a:p>
@@ -1390,7 +1401,7 @@
           </a:lstStyle>
           <a:p>
             <a:r>
-              <a:rPr lang="en-US" smtClean="0"/>
+              <a:rPr lang="en-US"/>
               <a:t>Click to edit Master title style</a:t>
             </a:r>
             <a:endParaRPr lang="en-US" dirty="0"/>
@@ -1458,7 +1469,7 @@
           <a:p>
             <a:pPr lvl="0"/>
             <a:r>
-              <a:rPr lang="en-US" smtClean="0"/>
+              <a:rPr lang="en-US"/>
               <a:t>Click to edit Master text styles</a:t>
             </a:r>
           </a:p>
@@ -1525,7 +1536,7 @@
           <a:p>
             <a:pPr lvl="0"/>
             <a:r>
-              <a:rPr lang="en-US" smtClean="0"/>
+              <a:rPr lang="en-US"/>
               <a:t>Click to edit Master text styles</a:t>
             </a:r>
           </a:p>
@@ -1548,7 +1559,7 @@
           <a:p>
             <a:fld id="{03953C3F-D36F-4B1A-A959-B36391D1B06D}" type="datetimeFigureOut">
               <a:rPr lang="en-US" smtClean="0"/>
-              <a:t>3/29/2016</a:t>
+              <a:t>3/30/2016</a:t>
             </a:fld>
             <a:endParaRPr lang="en-US" dirty="0"/>
           </a:p>
@@ -2027,7 +2038,7 @@
           </a:lstStyle>
           <a:p>
             <a:r>
-              <a:rPr lang="en-US" smtClean="0"/>
+              <a:rPr lang="en-US"/>
               <a:t>Click to edit Master title style</a:t>
             </a:r>
             <a:endParaRPr lang="en-US" dirty="0"/>
@@ -2093,7 +2104,7 @@
           <a:p>
             <a:pPr lvl="0"/>
             <a:r>
-              <a:rPr lang="en-US" smtClean="0"/>
+              <a:rPr lang="en-US"/>
               <a:t>Click to edit Master text styles</a:t>
             </a:r>
           </a:p>
@@ -2116,7 +2127,7 @@
           <a:p>
             <a:fld id="{03953C3F-D36F-4B1A-A959-B36391D1B06D}" type="datetimeFigureOut">
               <a:rPr lang="en-US" smtClean="0"/>
-              <a:t>3/29/2016</a:t>
+              <a:t>3/30/2016</a:t>
             </a:fld>
             <a:endParaRPr lang="en-US" dirty="0"/>
           </a:p>
@@ -2359,7 +2370,7 @@
           <a:lstStyle/>
           <a:p>
             <a:r>
-              <a:rPr lang="en-US" smtClean="0"/>
+              <a:rPr lang="en-US"/>
               <a:t>Click to edit Master title style</a:t>
             </a:r>
             <a:endParaRPr lang="en-US" dirty="0"/>
@@ -2431,7 +2442,7 @@
           <a:p>
             <a:pPr lvl="0"/>
             <a:r>
-              <a:rPr lang="en-US" smtClean="0"/>
+              <a:rPr lang="en-US"/>
               <a:t>Click to edit Master text styles</a:t>
             </a:r>
           </a:p>
@@ -2498,7 +2509,7 @@
           <a:p>
             <a:pPr lvl="0"/>
             <a:r>
-              <a:rPr lang="en-US" smtClean="0"/>
+              <a:rPr lang="en-US"/>
               <a:t>Click to edit Master text styles</a:t>
             </a:r>
           </a:p>
@@ -2569,7 +2580,7 @@
           <a:p>
             <a:pPr lvl="0"/>
             <a:r>
-              <a:rPr lang="en-US" smtClean="0"/>
+              <a:rPr lang="en-US"/>
               <a:t>Click to edit Master text styles</a:t>
             </a:r>
           </a:p>
@@ -2636,7 +2647,7 @@
           <a:p>
             <a:pPr lvl="0"/>
             <a:r>
-              <a:rPr lang="en-US" smtClean="0"/>
+              <a:rPr lang="en-US"/>
               <a:t>Click to edit Master text styles</a:t>
             </a:r>
           </a:p>
@@ -2707,7 +2718,7 @@
           <a:p>
             <a:pPr lvl="0"/>
             <a:r>
-              <a:rPr lang="en-US" smtClean="0"/>
+              <a:rPr lang="en-US"/>
               <a:t>Click to edit Master text styles</a:t>
             </a:r>
           </a:p>
@@ -2774,7 +2785,7 @@
           <a:p>
             <a:pPr lvl="0"/>
             <a:r>
-              <a:rPr lang="en-US" smtClean="0"/>
+              <a:rPr lang="en-US"/>
               <a:t>Click to edit Master text styles</a:t>
             </a:r>
           </a:p>
@@ -2797,7 +2808,7 @@
           <a:p>
             <a:fld id="{03953C3F-D36F-4B1A-A959-B36391D1B06D}" type="datetimeFigureOut">
               <a:rPr lang="en-US" smtClean="0"/>
-              <a:t>3/29/2016</a:t>
+              <a:t>3/30/2016</a:t>
             </a:fld>
             <a:endParaRPr lang="en-US" dirty="0"/>
           </a:p>
@@ -3035,7 +3046,7 @@
           <a:lstStyle/>
           <a:p>
             <a:r>
-              <a:rPr lang="en-US" smtClean="0"/>
+              <a:rPr lang="en-US"/>
               <a:t>Click to edit Master title style</a:t>
             </a:r>
             <a:endParaRPr lang="en-US" dirty="0"/>
@@ -3107,7 +3118,7 @@
           <a:p>
             <a:pPr lvl="0"/>
             <a:r>
-              <a:rPr lang="en-US" smtClean="0"/>
+              <a:rPr lang="en-US"/>
               <a:t>Click to edit Master text styles</a:t>
             </a:r>
           </a:p>
@@ -3185,7 +3196,7 @@
           </a:lstStyle>
           <a:p>
             <a:r>
-              <a:rPr lang="en-US" smtClean="0"/>
+              <a:rPr lang="en-US"/>
               <a:t>Click icon to add picture</a:t>
             </a:r>
             <a:endParaRPr lang="en-US" dirty="0"/>
@@ -3253,7 +3264,7 @@
           <a:p>
             <a:pPr lvl="0"/>
             <a:r>
-              <a:rPr lang="en-US" smtClean="0"/>
+              <a:rPr lang="en-US"/>
               <a:t>Click to edit Master text styles</a:t>
             </a:r>
           </a:p>
@@ -3324,7 +3335,7 @@
           <a:p>
             <a:pPr lvl="0"/>
             <a:r>
-              <a:rPr lang="en-US" smtClean="0"/>
+              <a:rPr lang="en-US"/>
               <a:t>Click to edit Master text styles</a:t>
             </a:r>
           </a:p>
@@ -3402,7 +3413,7 @@
           </a:lstStyle>
           <a:p>
             <a:r>
-              <a:rPr lang="en-US" smtClean="0"/>
+              <a:rPr lang="en-US"/>
               <a:t>Click icon to add picture</a:t>
             </a:r>
             <a:endParaRPr lang="en-US" dirty="0"/>
@@ -3470,7 +3481,7 @@
           <a:p>
             <a:pPr lvl="0"/>
             <a:r>
-              <a:rPr lang="en-US" smtClean="0"/>
+              <a:rPr lang="en-US"/>
               <a:t>Click to edit Master text styles</a:t>
             </a:r>
           </a:p>
@@ -3541,7 +3552,7 @@
           <a:p>
             <a:pPr lvl="0"/>
             <a:r>
-              <a:rPr lang="en-US" smtClean="0"/>
+              <a:rPr lang="en-US"/>
               <a:t>Click to edit Master text styles</a:t>
             </a:r>
           </a:p>
@@ -3619,7 +3630,7 @@
           </a:lstStyle>
           <a:p>
             <a:r>
-              <a:rPr lang="en-US" smtClean="0"/>
+              <a:rPr lang="en-US"/>
               <a:t>Click icon to add picture</a:t>
             </a:r>
             <a:endParaRPr lang="en-US" dirty="0"/>
@@ -3687,7 +3698,7 @@
           <a:p>
             <a:pPr lvl="0"/>
             <a:r>
-              <a:rPr lang="en-US" smtClean="0"/>
+              <a:rPr lang="en-US"/>
               <a:t>Click to edit Master text styles</a:t>
             </a:r>
           </a:p>
@@ -3710,7 +3721,7 @@
           <a:p>
             <a:fld id="{03953C3F-D36F-4B1A-A959-B36391D1B06D}" type="datetimeFigureOut">
               <a:rPr lang="en-US" smtClean="0"/>
-              <a:t>3/29/2016</a:t>
+              <a:t>3/30/2016</a:t>
             </a:fld>
             <a:endParaRPr lang="en-US" dirty="0"/>
           </a:p>
@@ -3947,7 +3958,7 @@
           </a:lstStyle>
           <a:p>
             <a:r>
-              <a:rPr lang="en-US" smtClean="0"/>
+              <a:rPr lang="en-US"/>
               <a:t>Click to edit Master title style</a:t>
             </a:r>
             <a:endParaRPr lang="en-US" dirty="0"/>
@@ -3971,35 +3982,35 @@
           <a:p>
             <a:pPr lvl="0"/>
             <a:r>
-              <a:rPr lang="en-US" smtClean="0"/>
+              <a:rPr lang="en-US"/>
               <a:t>Click to edit Master text styles</a:t>
             </a:r>
           </a:p>
           <a:p>
             <a:pPr lvl="1"/>
             <a:r>
-              <a:rPr lang="en-US" smtClean="0"/>
+              <a:rPr lang="en-US"/>
               <a:t>Second level</a:t>
             </a:r>
           </a:p>
           <a:p>
             <a:pPr lvl="2"/>
             <a:r>
-              <a:rPr lang="en-US" smtClean="0"/>
+              <a:rPr lang="en-US"/>
               <a:t>Third level</a:t>
             </a:r>
           </a:p>
           <a:p>
             <a:pPr lvl="3"/>
             <a:r>
-              <a:rPr lang="en-US" smtClean="0"/>
+              <a:rPr lang="en-US"/>
               <a:t>Fourth level</a:t>
             </a:r>
           </a:p>
           <a:p>
             <a:pPr lvl="4"/>
             <a:r>
-              <a:rPr lang="en-US" smtClean="0"/>
+              <a:rPr lang="en-US"/>
               <a:t>Fifth level</a:t>
             </a:r>
             <a:endParaRPr lang="en-US" dirty="0"/>
@@ -4023,7 +4034,7 @@
           <a:p>
             <a:fld id="{03953C3F-D36F-4B1A-A959-B36391D1B06D}" type="datetimeFigureOut">
               <a:rPr lang="en-US" smtClean="0"/>
-              <a:t>3/29/2016</a:t>
+              <a:t>3/30/2016</a:t>
             </a:fld>
             <a:endParaRPr lang="en-US" dirty="0"/>
           </a:p>
@@ -4201,7 +4212,7 @@
           <a:lstStyle/>
           <a:p>
             <a:r>
-              <a:rPr lang="en-US" smtClean="0"/>
+              <a:rPr lang="en-US"/>
               <a:t>Click to edit Master title style</a:t>
             </a:r>
             <a:endParaRPr lang="en-US" dirty="0"/>
@@ -4230,35 +4241,35 @@
           <a:p>
             <a:pPr lvl="0"/>
             <a:r>
-              <a:rPr lang="en-US" smtClean="0"/>
+              <a:rPr lang="en-US"/>
               <a:t>Click to edit Master text styles</a:t>
             </a:r>
           </a:p>
           <a:p>
             <a:pPr lvl="1"/>
             <a:r>
-              <a:rPr lang="en-US" smtClean="0"/>
+              <a:rPr lang="en-US"/>
               <a:t>Second level</a:t>
             </a:r>
           </a:p>
           <a:p>
             <a:pPr lvl="2"/>
             <a:r>
-              <a:rPr lang="en-US" smtClean="0"/>
+              <a:rPr lang="en-US"/>
               <a:t>Third level</a:t>
             </a:r>
           </a:p>
           <a:p>
             <a:pPr lvl="3"/>
             <a:r>
-              <a:rPr lang="en-US" smtClean="0"/>
+              <a:rPr lang="en-US"/>
               <a:t>Fourth level</a:t>
             </a:r>
           </a:p>
           <a:p>
             <a:pPr lvl="4"/>
             <a:r>
-              <a:rPr lang="en-US" smtClean="0"/>
+              <a:rPr lang="en-US"/>
               <a:t>Fifth level</a:t>
             </a:r>
             <a:endParaRPr lang="en-US" dirty="0"/>
@@ -4287,7 +4298,7 @@
           <a:p>
             <a:fld id="{03953C3F-D36F-4B1A-A959-B36391D1B06D}" type="datetimeFigureOut">
               <a:rPr lang="en-US" smtClean="0"/>
-              <a:t>3/29/2016</a:t>
+              <a:t>3/30/2016</a:t>
             </a:fld>
             <a:endParaRPr lang="en-US" dirty="0"/>
           </a:p>
@@ -4534,7 +4545,7 @@
           <a:lstStyle/>
           <a:p>
             <a:r>
-              <a:rPr lang="en-US" smtClean="0"/>
+              <a:rPr lang="en-US"/>
               <a:t>Click to edit Master title style</a:t>
             </a:r>
             <a:endParaRPr lang="en-US" dirty="0"/>
@@ -4558,35 +4569,35 @@
           <a:p>
             <a:pPr lvl="0"/>
             <a:r>
-              <a:rPr lang="en-US" smtClean="0"/>
+              <a:rPr lang="en-US"/>
               <a:t>Click to edit Master text styles</a:t>
             </a:r>
           </a:p>
           <a:p>
             <a:pPr lvl="1"/>
             <a:r>
-              <a:rPr lang="en-US" smtClean="0"/>
+              <a:rPr lang="en-US"/>
               <a:t>Second level</a:t>
             </a:r>
           </a:p>
           <a:p>
             <a:pPr lvl="2"/>
             <a:r>
-              <a:rPr lang="en-US" smtClean="0"/>
+              <a:rPr lang="en-US"/>
               <a:t>Third level</a:t>
             </a:r>
           </a:p>
           <a:p>
             <a:pPr lvl="3"/>
             <a:r>
-              <a:rPr lang="en-US" smtClean="0"/>
+              <a:rPr lang="en-US"/>
               <a:t>Fourth level</a:t>
             </a:r>
           </a:p>
           <a:p>
             <a:pPr lvl="4"/>
             <a:r>
-              <a:rPr lang="en-US" smtClean="0"/>
+              <a:rPr lang="en-US"/>
               <a:t>Fifth level</a:t>
             </a:r>
             <a:endParaRPr lang="en-US" dirty="0"/>
@@ -4610,7 +4621,7 @@
           <a:p>
             <a:fld id="{03953C3F-D36F-4B1A-A959-B36391D1B06D}" type="datetimeFigureOut">
               <a:rPr lang="en-US" smtClean="0"/>
-              <a:t>3/29/2016</a:t>
+              <a:t>3/30/2016</a:t>
             </a:fld>
             <a:endParaRPr lang="en-US" dirty="0"/>
           </a:p>
@@ -4854,7 +4865,7 @@
           </a:lstStyle>
           <a:p>
             <a:r>
-              <a:rPr lang="en-US" smtClean="0"/>
+              <a:rPr lang="en-US"/>
               <a:t>Click to edit Master title style</a:t>
             </a:r>
             <a:endParaRPr lang="en-US" dirty="0"/>
@@ -4976,7 +4987,7 @@
           <a:p>
             <a:pPr lvl="0"/>
             <a:r>
-              <a:rPr lang="en-US" smtClean="0"/>
+              <a:rPr lang="en-US"/>
               <a:t>Click to edit Master text styles</a:t>
             </a:r>
           </a:p>
@@ -4999,7 +5010,7 @@
           <a:p>
             <a:fld id="{03953C3F-D36F-4B1A-A959-B36391D1B06D}" type="datetimeFigureOut">
               <a:rPr lang="en-US" smtClean="0"/>
-              <a:t>3/29/2016</a:t>
+              <a:t>3/30/2016</a:t>
             </a:fld>
             <a:endParaRPr lang="en-US" dirty="0"/>
           </a:p>
@@ -5237,7 +5248,7 @@
           <a:lstStyle/>
           <a:p>
             <a:r>
-              <a:rPr lang="en-US" smtClean="0"/>
+              <a:rPr lang="en-US"/>
               <a:t>Click to edit Master title style</a:t>
             </a:r>
             <a:endParaRPr lang="en-US" dirty="0"/>
@@ -5266,35 +5277,35 @@
           <a:p>
             <a:pPr lvl="0"/>
             <a:r>
-              <a:rPr lang="en-US" smtClean="0"/>
+              <a:rPr lang="en-US"/>
               <a:t>Click to edit Master text styles</a:t>
             </a:r>
           </a:p>
           <a:p>
             <a:pPr lvl="1"/>
             <a:r>
-              <a:rPr lang="en-US" smtClean="0"/>
+              <a:rPr lang="en-US"/>
               <a:t>Second level</a:t>
             </a:r>
           </a:p>
           <a:p>
             <a:pPr lvl="2"/>
             <a:r>
-              <a:rPr lang="en-US" smtClean="0"/>
+              <a:rPr lang="en-US"/>
               <a:t>Third level</a:t>
             </a:r>
           </a:p>
           <a:p>
             <a:pPr lvl="3"/>
             <a:r>
-              <a:rPr lang="en-US" smtClean="0"/>
+              <a:rPr lang="en-US"/>
               <a:t>Fourth level</a:t>
             </a:r>
           </a:p>
           <a:p>
             <a:pPr lvl="4"/>
             <a:r>
-              <a:rPr lang="en-US" smtClean="0"/>
+              <a:rPr lang="en-US"/>
               <a:t>Fifth level</a:t>
             </a:r>
             <a:endParaRPr lang="en-US" dirty="0"/>
@@ -5323,35 +5334,35 @@
           <a:p>
             <a:pPr lvl="0"/>
             <a:r>
-              <a:rPr lang="en-US" smtClean="0"/>
+              <a:rPr lang="en-US"/>
               <a:t>Click to edit Master text styles</a:t>
             </a:r>
           </a:p>
           <a:p>
             <a:pPr lvl="1"/>
             <a:r>
-              <a:rPr lang="en-US" smtClean="0"/>
+              <a:rPr lang="en-US"/>
               <a:t>Second level</a:t>
             </a:r>
           </a:p>
           <a:p>
             <a:pPr lvl="2"/>
             <a:r>
-              <a:rPr lang="en-US" smtClean="0"/>
+              <a:rPr lang="en-US"/>
               <a:t>Third level</a:t>
             </a:r>
           </a:p>
           <a:p>
             <a:pPr lvl="3"/>
             <a:r>
-              <a:rPr lang="en-US" smtClean="0"/>
+              <a:rPr lang="en-US"/>
               <a:t>Fourth level</a:t>
             </a:r>
           </a:p>
           <a:p>
             <a:pPr lvl="4"/>
             <a:r>
-              <a:rPr lang="en-US" smtClean="0"/>
+              <a:rPr lang="en-US"/>
               <a:t>Fifth level</a:t>
             </a:r>
             <a:endParaRPr lang="en-US" dirty="0"/>
@@ -5375,7 +5386,7 @@
           <a:p>
             <a:fld id="{03953C3F-D36F-4B1A-A959-B36391D1B06D}" type="datetimeFigureOut">
               <a:rPr lang="en-US" smtClean="0"/>
-              <a:t>3/29/2016</a:t>
+              <a:t>3/30/2016</a:t>
             </a:fld>
             <a:endParaRPr lang="en-US" dirty="0"/>
           </a:p>
@@ -5613,7 +5624,7 @@
           <a:lstStyle/>
           <a:p>
             <a:r>
-              <a:rPr lang="en-US" smtClean="0"/>
+              <a:rPr lang="en-US"/>
               <a:t>Click to edit Master title style</a:t>
             </a:r>
             <a:endParaRPr lang="en-US" dirty="0"/>
@@ -5679,7 +5690,7 @@
           <a:p>
             <a:pPr lvl="0"/>
             <a:r>
-              <a:rPr lang="en-US" smtClean="0"/>
+              <a:rPr lang="en-US"/>
               <a:t>Click to edit Master text styles</a:t>
             </a:r>
           </a:p>
@@ -5707,35 +5718,35 @@
           <a:p>
             <a:pPr lvl="0"/>
             <a:r>
-              <a:rPr lang="en-US" smtClean="0"/>
+              <a:rPr lang="en-US"/>
               <a:t>Click to edit Master text styles</a:t>
             </a:r>
           </a:p>
           <a:p>
             <a:pPr lvl="1"/>
             <a:r>
-              <a:rPr lang="en-US" smtClean="0"/>
+              <a:rPr lang="en-US"/>
               <a:t>Second level</a:t>
             </a:r>
           </a:p>
           <a:p>
             <a:pPr lvl="2"/>
             <a:r>
-              <a:rPr lang="en-US" smtClean="0"/>
+              <a:rPr lang="en-US"/>
               <a:t>Third level</a:t>
             </a:r>
           </a:p>
           <a:p>
             <a:pPr lvl="3"/>
             <a:r>
-              <a:rPr lang="en-US" smtClean="0"/>
+              <a:rPr lang="en-US"/>
               <a:t>Fourth level</a:t>
             </a:r>
           </a:p>
           <a:p>
             <a:pPr lvl="4"/>
             <a:r>
-              <a:rPr lang="en-US" smtClean="0"/>
+              <a:rPr lang="en-US"/>
               <a:t>Fifth level</a:t>
             </a:r>
             <a:endParaRPr lang="en-US" dirty="0"/>
@@ -5801,7 +5812,7 @@
           <a:p>
             <a:pPr lvl="0"/>
             <a:r>
-              <a:rPr lang="en-US" smtClean="0"/>
+              <a:rPr lang="en-US"/>
               <a:t>Click to edit Master text styles</a:t>
             </a:r>
           </a:p>
@@ -5829,35 +5840,35 @@
           <a:p>
             <a:pPr lvl="0"/>
             <a:r>
-              <a:rPr lang="en-US" smtClean="0"/>
+              <a:rPr lang="en-US"/>
               <a:t>Click to edit Master text styles</a:t>
             </a:r>
           </a:p>
           <a:p>
             <a:pPr lvl="1"/>
             <a:r>
-              <a:rPr lang="en-US" smtClean="0"/>
+              <a:rPr lang="en-US"/>
               <a:t>Second level</a:t>
             </a:r>
           </a:p>
           <a:p>
             <a:pPr lvl="2"/>
             <a:r>
-              <a:rPr lang="en-US" smtClean="0"/>
+              <a:rPr lang="en-US"/>
               <a:t>Third level</a:t>
             </a:r>
           </a:p>
           <a:p>
             <a:pPr lvl="3"/>
             <a:r>
-              <a:rPr lang="en-US" smtClean="0"/>
+              <a:rPr lang="en-US"/>
               <a:t>Fourth level</a:t>
             </a:r>
           </a:p>
           <a:p>
             <a:pPr lvl="4"/>
             <a:r>
-              <a:rPr lang="en-US" smtClean="0"/>
+              <a:rPr lang="en-US"/>
               <a:t>Fifth level</a:t>
             </a:r>
             <a:endParaRPr lang="en-US" dirty="0"/>
@@ -5881,7 +5892,7 @@
           <a:p>
             <a:fld id="{03953C3F-D36F-4B1A-A959-B36391D1B06D}" type="datetimeFigureOut">
               <a:rPr lang="en-US" smtClean="0"/>
-              <a:t>3/29/2016</a:t>
+              <a:t>3/30/2016</a:t>
             </a:fld>
             <a:endParaRPr lang="en-US" dirty="0"/>
           </a:p>
@@ -6114,7 +6125,7 @@
           <a:lstStyle/>
           <a:p>
             <a:r>
-              <a:rPr lang="en-US" smtClean="0"/>
+              <a:rPr lang="en-US"/>
               <a:t>Click to edit Master title style</a:t>
             </a:r>
             <a:endParaRPr lang="en-US" dirty="0"/>
@@ -6138,7 +6149,7 @@
           <a:p>
             <a:fld id="{03953C3F-D36F-4B1A-A959-B36391D1B06D}" type="datetimeFigureOut">
               <a:rPr lang="en-US" smtClean="0"/>
-              <a:t>3/29/2016</a:t>
+              <a:t>3/30/2016</a:t>
             </a:fld>
             <a:endParaRPr lang="en-US" dirty="0"/>
           </a:p>
@@ -6301,7 +6312,7 @@
           <a:p>
             <a:fld id="{03953C3F-D36F-4B1A-A959-B36391D1B06D}" type="datetimeFigureOut">
               <a:rPr lang="en-US" smtClean="0"/>
-              <a:t>3/29/2016</a:t>
+              <a:t>3/30/2016</a:t>
             </a:fld>
             <a:endParaRPr lang="en-US" dirty="0"/>
           </a:p>
@@ -6545,7 +6556,7 @@
           </a:lstStyle>
           <a:p>
             <a:r>
-              <a:rPr lang="en-US" smtClean="0"/>
+              <a:rPr lang="en-US"/>
               <a:t>Click to edit Master title style</a:t>
             </a:r>
             <a:endParaRPr lang="en-US" dirty="0"/>
@@ -6574,35 +6585,35 @@
           <a:p>
             <a:pPr lvl="0"/>
             <a:r>
-              <a:rPr lang="en-US" smtClean="0"/>
+              <a:rPr lang="en-US"/>
               <a:t>Click to edit Master text styles</a:t>
             </a:r>
           </a:p>
           <a:p>
             <a:pPr lvl="1"/>
             <a:r>
-              <a:rPr lang="en-US" smtClean="0"/>
+              <a:rPr lang="en-US"/>
               <a:t>Second level</a:t>
             </a:r>
           </a:p>
           <a:p>
             <a:pPr lvl="2"/>
             <a:r>
-              <a:rPr lang="en-US" smtClean="0"/>
+              <a:rPr lang="en-US"/>
               <a:t>Third level</a:t>
             </a:r>
           </a:p>
           <a:p>
             <a:pPr lvl="3"/>
             <a:r>
-              <a:rPr lang="en-US" smtClean="0"/>
+              <a:rPr lang="en-US"/>
               <a:t>Fourth level</a:t>
             </a:r>
           </a:p>
           <a:p>
             <a:pPr lvl="4"/>
             <a:r>
-              <a:rPr lang="en-US" smtClean="0"/>
+              <a:rPr lang="en-US"/>
               <a:t>Fifth level</a:t>
             </a:r>
             <a:endParaRPr lang="en-US" dirty="0"/>
@@ -6668,7 +6679,7 @@
           <a:p>
             <a:pPr lvl="0"/>
             <a:r>
-              <a:rPr lang="en-US" smtClean="0"/>
+              <a:rPr lang="en-US"/>
               <a:t>Click to edit Master text styles</a:t>
             </a:r>
           </a:p>
@@ -6691,7 +6702,7 @@
           <a:p>
             <a:fld id="{03953C3F-D36F-4B1A-A959-B36391D1B06D}" type="datetimeFigureOut">
               <a:rPr lang="en-US" smtClean="0"/>
-              <a:t>3/29/2016</a:t>
+              <a:t>3/30/2016</a:t>
             </a:fld>
             <a:endParaRPr lang="en-US" dirty="0"/>
           </a:p>
@@ -6935,7 +6946,7 @@
           </a:lstStyle>
           <a:p>
             <a:r>
-              <a:rPr lang="en-US" smtClean="0"/>
+              <a:rPr lang="en-US"/>
               <a:t>Click to edit Master title style</a:t>
             </a:r>
             <a:endParaRPr lang="en-US" dirty="0"/>
@@ -7011,7 +7022,7 @@
           </a:lstStyle>
           <a:p>
             <a:r>
-              <a:rPr lang="en-US" smtClean="0"/>
+              <a:rPr lang="en-US"/>
               <a:t>Click icon to add picture</a:t>
             </a:r>
             <a:endParaRPr lang="en-US" dirty="0"/>
@@ -7077,7 +7088,7 @@
           <a:p>
             <a:pPr lvl="0"/>
             <a:r>
-              <a:rPr lang="en-US" smtClean="0"/>
+              <a:rPr lang="en-US"/>
               <a:t>Click to edit Master text styles</a:t>
             </a:r>
           </a:p>
@@ -7100,7 +7111,7 @@
           <a:p>
             <a:fld id="{03953C3F-D36F-4B1A-A959-B36391D1B06D}" type="datetimeFigureOut">
               <a:rPr lang="en-US" smtClean="0"/>
-              <a:t>3/29/2016</a:t>
+              <a:t>3/30/2016</a:t>
             </a:fld>
             <a:endParaRPr lang="en-US" dirty="0"/>
           </a:p>
@@ -7240,7 +7251,7 @@
           <a:lstStyle/>
           <a:p>
             <a:r>
-              <a:rPr lang="en-US" smtClean="0"/>
+              <a:rPr lang="en-US"/>
               <a:t>Click to edit Master title style</a:t>
             </a:r>
             <a:endParaRPr lang="en-US" dirty="0"/>
@@ -7274,35 +7285,35 @@
           <a:p>
             <a:pPr lvl="0"/>
             <a:r>
-              <a:rPr lang="en-US" smtClean="0"/>
+              <a:rPr lang="en-US"/>
               <a:t>Click to edit Master text styles</a:t>
             </a:r>
           </a:p>
           <a:p>
             <a:pPr lvl="1"/>
             <a:r>
-              <a:rPr lang="en-US" smtClean="0"/>
+              <a:rPr lang="en-US"/>
               <a:t>Second level</a:t>
             </a:r>
           </a:p>
           <a:p>
             <a:pPr lvl="2"/>
             <a:r>
-              <a:rPr lang="en-US" smtClean="0"/>
+              <a:rPr lang="en-US"/>
               <a:t>Third level</a:t>
             </a:r>
           </a:p>
           <a:p>
             <a:pPr lvl="3"/>
             <a:r>
-              <a:rPr lang="en-US" smtClean="0"/>
+              <a:rPr lang="en-US"/>
               <a:t>Fourth level</a:t>
             </a:r>
           </a:p>
           <a:p>
             <a:pPr lvl="4"/>
             <a:r>
-              <a:rPr lang="en-US" smtClean="0"/>
+              <a:rPr lang="en-US"/>
               <a:t>Fifth level</a:t>
             </a:r>
             <a:endParaRPr lang="en-US" dirty="0"/>
@@ -7344,7 +7355,7 @@
           <a:p>
             <a:fld id="{03953C3F-D36F-4B1A-A959-B36391D1B06D}" type="datetimeFigureOut">
               <a:rPr lang="en-US" smtClean="0"/>
-              <a:t>3/29/2016</a:t>
+              <a:t>3/30/2016</a:t>
             </a:fld>
             <a:endParaRPr lang="en-US" dirty="0"/>
           </a:p>
@@ -7771,10 +7782,9 @@
           <a:lstStyle/>
           <a:p>
             <a:r>
-              <a:rPr lang="en-US" dirty="0" smtClean="0"/>
+              <a:rPr lang="en-US" dirty="0"/>
               <a:t>Data Mining Project 2</a:t>
             </a:r>
-            <a:endParaRPr lang="en-US" dirty="0"/>
           </a:p>
         </p:txBody>
       </p:sp>
@@ -7794,16 +7804,15 @@
           <a:lstStyle/>
           <a:p>
             <a:r>
-              <a:rPr lang="en-US" dirty="0" smtClean="0"/>
+              <a:rPr lang="en-US" dirty="0"/>
               <a:t>Jeff Wood</a:t>
             </a:r>
           </a:p>
           <a:p>
             <a:r>
-              <a:rPr lang="en-US" dirty="0" smtClean="0"/>
+              <a:rPr lang="en-US" dirty="0"/>
               <a:t>Ethan Bowen</a:t>
             </a:r>
-            <a:endParaRPr lang="en-US" dirty="0"/>
           </a:p>
         </p:txBody>
       </p:sp>
@@ -7817,13 +7826,6 @@
   <p:clrMapOvr>
     <a:masterClrMapping/>
   </p:clrMapOvr>
-  <p:timing>
-    <p:tnLst>
-      <p:par>
-        <p:cTn id="1" dur="indefinite" restart="never" nodeType="tmRoot"/>
-      </p:par>
-    </p:tnLst>
-  </p:timing>
 </p:sld>
 </file>
 
@@ -7860,18 +7862,13 @@
           <a:lstStyle/>
           <a:p>
             <a:r>
-              <a:rPr lang="en-US" dirty="0" smtClean="0"/>
-              <a:t>Dataset </a:t>
-            </a:r>
-            <a:r>
               <a:rPr lang="en-US" dirty="0"/>
-              <a:t>– </a:t>
-            </a:r>
-            <a:r>
-              <a:rPr lang="en-US" i="1" dirty="0" smtClean="0"/>
+              <a:t>Dataset – </a:t>
+            </a:r>
+            <a:r>
+              <a:rPr lang="en-US" i="1" dirty="0"/>
               <a:t>ATNTFaceImages400.txt</a:t>
             </a:r>
-            <a:endParaRPr lang="en-US" i="1" dirty="0"/>
           </a:p>
         </p:txBody>
       </p:sp>
@@ -7891,42 +7888,36 @@
           <a:lstStyle/>
           <a:p>
             <a:r>
-              <a:rPr lang="en-US" dirty="0" smtClean="0"/>
+              <a:rPr lang="en-US" dirty="0"/>
               <a:t>400 data points</a:t>
             </a:r>
           </a:p>
           <a:p>
             <a:pPr lvl="1"/>
             <a:r>
-              <a:rPr lang="en-US" dirty="0" smtClean="0"/>
-              <a:t>40 </a:t>
-            </a:r>
-            <a:r>
-              <a:rPr lang="en-US" dirty="0" smtClean="0"/>
-              <a:t>classes</a:t>
+              <a:rPr lang="en-US" dirty="0"/>
+              <a:t>40 classes</a:t>
             </a:r>
           </a:p>
           <a:p>
             <a:pPr lvl="1"/>
             <a:r>
-              <a:rPr lang="en-US" dirty="0" smtClean="0"/>
+              <a:rPr lang="en-US" dirty="0"/>
               <a:t>10 data points per class</a:t>
             </a:r>
-            <a:endParaRPr lang="en-US" dirty="0" smtClean="0"/>
-          </a:p>
-          <a:p>
-            <a:r>
-              <a:rPr lang="en-US" dirty="0" smtClean="0"/>
+          </a:p>
+          <a:p>
+            <a:r>
+              <a:rPr lang="en-US" dirty="0"/>
               <a:t>644 Length vector</a:t>
             </a:r>
           </a:p>
           <a:p>
             <a:pPr lvl="1"/>
             <a:r>
-              <a:rPr lang="en-US" dirty="0" smtClean="0"/>
+              <a:rPr lang="en-US" dirty="0"/>
               <a:t>28 x 23 sized images</a:t>
             </a:r>
-            <a:endParaRPr lang="en-US" dirty="0"/>
           </a:p>
         </p:txBody>
       </p:sp>
@@ -7970,13 +7961,6 @@
   <p:clrMapOvr>
     <a:masterClrMapping/>
   </p:clrMapOvr>
-  <p:timing>
-    <p:tnLst>
-      <p:par>
-        <p:cTn id="1" dur="indefinite" restart="never" nodeType="tmRoot"/>
-      </p:par>
-    </p:tnLst>
-  </p:timing>
 </p:sld>
 </file>
 
@@ -8013,18 +7997,13 @@
           <a:lstStyle/>
           <a:p>
             <a:r>
-              <a:rPr lang="en-US" dirty="0" smtClean="0"/>
-              <a:t>Dataset </a:t>
-            </a:r>
-            <a:r>
               <a:rPr lang="en-US" dirty="0"/>
-              <a:t>– </a:t>
-            </a:r>
-            <a:r>
-              <a:rPr lang="en-US" i="1" dirty="0" smtClean="0"/>
+              <a:t>Dataset – </a:t>
+            </a:r>
+            <a:r>
+              <a:rPr lang="en-US" i="1" dirty="0"/>
               <a:t>HandWrittenLetters.txt</a:t>
             </a:r>
-            <a:endParaRPr lang="en-US" i="1" dirty="0"/>
           </a:p>
         </p:txBody>
       </p:sp>
@@ -8044,42 +8023,36 @@
           <a:lstStyle/>
           <a:p>
             <a:r>
-              <a:rPr lang="en-US" dirty="0" smtClean="0"/>
+              <a:rPr lang="en-US" dirty="0"/>
               <a:t>1,014 data points</a:t>
             </a:r>
           </a:p>
           <a:p>
             <a:pPr lvl="1"/>
             <a:r>
-              <a:rPr lang="en-US" dirty="0" smtClean="0"/>
-              <a:t>26 </a:t>
-            </a:r>
-            <a:r>
-              <a:rPr lang="en-US" dirty="0" smtClean="0"/>
-              <a:t>classes</a:t>
+              <a:rPr lang="en-US" dirty="0"/>
+              <a:t>26 classes</a:t>
             </a:r>
           </a:p>
           <a:p>
             <a:pPr lvl="1"/>
             <a:r>
-              <a:rPr lang="en-US" dirty="0" smtClean="0"/>
+              <a:rPr lang="en-US" dirty="0"/>
               <a:t>39 data points per class</a:t>
             </a:r>
-            <a:endParaRPr lang="en-US" dirty="0" smtClean="0"/>
-          </a:p>
-          <a:p>
-            <a:r>
-              <a:rPr lang="en-US" dirty="0" smtClean="0"/>
+          </a:p>
+          <a:p>
+            <a:r>
+              <a:rPr lang="en-US" dirty="0"/>
               <a:t>644 Length vector</a:t>
             </a:r>
           </a:p>
           <a:p>
             <a:pPr lvl="1"/>
             <a:r>
-              <a:rPr lang="en-US" dirty="0" smtClean="0"/>
+              <a:rPr lang="en-US" dirty="0"/>
               <a:t>20 x 16 sized images</a:t>
             </a:r>
-            <a:endParaRPr lang="en-US" dirty="0"/>
           </a:p>
         </p:txBody>
       </p:sp>
@@ -8123,13 +8096,6 @@
   <p:clrMapOvr>
     <a:masterClrMapping/>
   </p:clrMapOvr>
-  <p:timing>
-    <p:tnLst>
-      <p:par>
-        <p:cTn id="1" dur="indefinite" restart="never" nodeType="tmRoot"/>
-      </p:par>
-    </p:tnLst>
-  </p:timing>
 </p:sld>
 </file>
 
@@ -8166,10 +8132,9 @@
           <a:lstStyle/>
           <a:p>
             <a:r>
-              <a:rPr lang="en-US" dirty="0" smtClean="0"/>
+              <a:rPr lang="en-US" dirty="0"/>
               <a:t>K-Fold Algorithm</a:t>
             </a:r>
-            <a:endParaRPr lang="en-US" dirty="0"/>
           </a:p>
         </p:txBody>
       </p:sp>
@@ -8191,14 +8156,14 @@
               <a:lstStyle/>
               <a:p>
                 <a:r>
-                  <a:rPr lang="en-US" dirty="0" smtClean="0"/>
+                  <a:rPr lang="en-US" dirty="0"/>
                   <a:t>Originally tested Idea of all discrete combinations</a:t>
                 </a:r>
               </a:p>
               <a:p>
                 <a:pPr lvl="1"/>
                 <a:r>
-                  <a:rPr lang="en-US" dirty="0" smtClean="0"/>
+                  <a:rPr lang="en-US" dirty="0"/>
                   <a:t>Results in </a:t>
                 </a:r>
                 <a14:m>
@@ -8207,7 +8172,7 @@
                       <m:fPr>
                         <m:ctrlPr>
                           <a:rPr lang="en-US" i="1" smtClean="0">
-                            <a:latin typeface="Cambria Math"/>
+                            <a:latin typeface="Cambria Math" panose="02040503050406030204" pitchFamily="18" charset="0"/>
                           </a:rPr>
                         </m:ctrlPr>
                       </m:fPr>
@@ -8242,7 +8207,7 @@
                           <m:dPr>
                             <m:ctrlPr>
                               <a:rPr lang="en-US" b="0" i="1" smtClean="0">
-                                <a:latin typeface="Cambria Math"/>
+                                <a:latin typeface="Cambria Math" panose="02040503050406030204" pitchFamily="18" charset="0"/>
                               </a:rPr>
                             </m:ctrlPr>
                           </m:dPr>
@@ -8278,7 +8243,7 @@
                   </m:oMath>
                 </a14:m>
                 <a:r>
-                  <a:rPr lang="en-US" dirty="0" smtClean="0"/>
+                  <a:rPr lang="en-US" dirty="0"/>
                   <a:t> subsets to test where:</a:t>
                 </a:r>
               </a:p>
@@ -8295,14 +8260,14 @@
                   </m:oMath>
                 </a14:m>
                 <a:r>
-                  <a:rPr lang="en-US" dirty="0" smtClean="0"/>
+                  <a:rPr lang="en-US" dirty="0"/>
                   <a:t> is the number of </a:t>
                 </a:r>
                 <a:r>
-                  <a:rPr lang="en-US" dirty="0" err="1" smtClean="0"/>
+                  <a:rPr lang="en-US" dirty="0" err="1"/>
                   <a:t>datapoints</a:t>
                 </a:r>
-                <a:endParaRPr lang="en-US" dirty="0" smtClean="0"/>
+                <a:endParaRPr lang="en-US" dirty="0"/>
               </a:p>
               <a:p>
                 <a:pPr lvl="2"/>
@@ -8318,58 +8283,54 @@
                 </a14:m>
                 <a:r>
                   <a:rPr lang="en-US" dirty="0"/>
-                  <a:t> </a:t>
-                </a:r>
-                <a:r>
-                  <a:rPr lang="en-US" dirty="0" smtClean="0"/>
-                  <a:t>is the subset size</a:t>
+                  <a:t> is the subset size</a:t>
                 </a:r>
               </a:p>
               <a:p>
                 <a:pPr lvl="1"/>
                 <a:r>
-                  <a:rPr lang="en-US" dirty="0" smtClean="0"/>
+                  <a:rPr lang="en-US" dirty="0"/>
                   <a:t>Impractical using </a:t>
                 </a:r>
                 <a:r>
-                  <a:rPr lang="en-US" dirty="0" err="1" smtClean="0"/>
+                  <a:rPr lang="en-US" dirty="0" err="1"/>
                   <a:t>MatLab</a:t>
                 </a:r>
-                <a:endParaRPr lang="en-US" dirty="0" smtClean="0"/>
+                <a:endParaRPr lang="en-US" dirty="0"/>
               </a:p>
               <a:p>
                 <a:r>
-                  <a:rPr lang="en-US" dirty="0" smtClean="0"/>
+                  <a:rPr lang="en-US" dirty="0"/>
                   <a:t>Implemented </a:t>
                 </a:r>
                 <a:r>
-                  <a:rPr lang="en-US" i="1" dirty="0" smtClean="0"/>
+                  <a:rPr lang="en-US" i="1" dirty="0"/>
                   <a:t>k</a:t>
                 </a:r>
                 <a:r>
-                  <a:rPr lang="en-US" dirty="0" smtClean="0"/>
+                  <a:rPr lang="en-US" dirty="0"/>
                   <a:t>-fold</a:t>
                 </a:r>
               </a:p>
               <a:p>
                 <a:pPr lvl="1"/>
                 <a:r>
-                  <a:rPr lang="en-US" dirty="0" smtClean="0"/>
+                  <a:rPr lang="en-US" dirty="0"/>
                   <a:t>Results in </a:t>
                 </a:r>
                 <a:r>
-                  <a:rPr lang="en-US" i="1" dirty="0" smtClean="0"/>
+                  <a:rPr lang="en-US" i="1" dirty="0"/>
                   <a:t>k</a:t>
                 </a:r>
                 <a:r>
-                  <a:rPr lang="en-US" dirty="0" smtClean="0"/>
+                  <a:rPr lang="en-US" dirty="0"/>
                   <a:t> subsets</a:t>
                 </a:r>
               </a:p>
               <a:p>
                 <a:pPr lvl="1"/>
                 <a:r>
-                  <a:rPr lang="en-US" dirty="0" smtClean="0"/>
+                  <a:rPr lang="en-US" dirty="0"/>
                   <a:t>Subsets of size </a:t>
                 </a:r>
                 <a14:m>
@@ -8393,7 +8354,7 @@
                       <m:fPr>
                         <m:ctrlPr>
                           <a:rPr lang="en-US" i="1">
-                            <a:latin typeface="Cambria Math"/>
+                            <a:latin typeface="Cambria Math" panose="02040503050406030204" pitchFamily="18" charset="0"/>
                           </a:rPr>
                         </m:ctrlPr>
                       </m:fPr>
@@ -8423,14 +8384,14 @@
               </a:p>
               <a:p>
                 <a:pPr lvl="1"/>
-                <a:endParaRPr lang="en-US" dirty="0" smtClean="0"/>
+                <a:endParaRPr lang="en-US" dirty="0"/>
               </a:p>
               <a:p>
                 <a:pPr lvl="1"/>
-                <a:endParaRPr lang="en-US" dirty="0" smtClean="0"/>
+                <a:endParaRPr lang="en-US" dirty="0"/>
               </a:p>
               <a:p>
-                <a:endParaRPr lang="en-US" dirty="0" smtClean="0"/>
+                <a:endParaRPr lang="en-US" dirty="0"/>
               </a:p>
             </p:txBody>
           </p:sp>
@@ -8479,13 +8440,6 @@
   <p:clrMapOvr>
     <a:masterClrMapping/>
   </p:clrMapOvr>
-  <p:timing>
-    <p:tnLst>
-      <p:par>
-        <p:cTn id="1" dur="indefinite" restart="never" nodeType="tmRoot"/>
-      </p:par>
-    </p:tnLst>
-  </p:timing>
 </p:sld>
 </file>
 
@@ -8522,371 +8476,14 @@
           <a:lstStyle/>
           <a:p>
             <a:r>
-              <a:rPr lang="en-US" dirty="0" smtClean="0"/>
-              <a:t>Clustering of Data</a:t>
-            </a:r>
-            <a:endParaRPr lang="en-US" dirty="0"/>
+              <a:rPr lang="en-US" dirty="0"/>
+              <a:t>K-Means Clustering</a:t>
+            </a:r>
           </a:p>
         </p:txBody>
       </p:sp>
       <mc:AlternateContent xmlns:mc="http://schemas.openxmlformats.org/markup-compatibility/2006" xmlns:a14="http://schemas.microsoft.com/office/drawing/2010/main">
         <mc:Choice Requires="a14">
-          <p:sp>
-            <p:nvSpPr>
-              <p:cNvPr id="3" name="Content Placeholder 2"/>
-              <p:cNvSpPr>
-                <a:spLocks noGrp="1"/>
-              </p:cNvSpPr>
-              <p:nvPr>
-                <p:ph idx="1"/>
-              </p:nvPr>
-            </p:nvSpPr>
-            <p:spPr/>
-            <p:txBody>
-              <a:bodyPr/>
-              <a:lstStyle/>
-              <a:p>
-                <a:r>
-                  <a:rPr lang="en-US" dirty="0" smtClean="0"/>
-                  <a:t>Originally tested Idea of all discrete combinations</a:t>
-                </a:r>
-              </a:p>
-              <a:p>
-                <a:pPr lvl="1"/>
-                <a:r>
-                  <a:rPr lang="en-US" dirty="0" smtClean="0"/>
-                  <a:t>Results in </a:t>
-                </a:r>
-                <a14:m>
-                  <m:oMath xmlns:m="http://schemas.openxmlformats.org/officeDocument/2006/math">
-                    <m:f>
-                      <m:fPr>
-                        <m:ctrlPr>
-                          <a:rPr lang="en-US" i="1" smtClean="0">
-                            <a:latin typeface="Cambria Math"/>
-                          </a:rPr>
-                        </m:ctrlPr>
-                      </m:fPr>
-                      <m:num>
-                        <m:r>
-                          <a:rPr lang="en-US" b="0" i="1" smtClean="0">
-                            <a:latin typeface="Cambria Math"/>
-                          </a:rPr>
-                          <m:t>𝑛</m:t>
-                        </m:r>
-                        <m:r>
-                          <a:rPr lang="en-US" b="0" i="1" smtClean="0">
-                            <a:latin typeface="Cambria Math"/>
-                          </a:rPr>
-                          <m:t>!</m:t>
-                        </m:r>
-                      </m:num>
-                      <m:den>
-                        <m:r>
-                          <a:rPr lang="en-US" b="0" i="1" smtClean="0">
-                            <a:latin typeface="Cambria Math"/>
-                          </a:rPr>
-                          <m:t>𝑠</m:t>
-                        </m:r>
-                        <m:r>
-                          <a:rPr lang="en-US" b="0" i="1" smtClean="0">
-                            <a:latin typeface="Cambria Math"/>
-                          </a:rPr>
-                          <m:t>! </m:t>
-                        </m:r>
-                        <m:d>
-                          <m:dPr>
-                            <m:ctrlPr>
-                              <a:rPr lang="en-US" b="0" i="1" smtClean="0">
-                                <a:latin typeface="Cambria Math"/>
-                              </a:rPr>
-                            </m:ctrlPr>
-                          </m:dPr>
-                          <m:e>
-                            <m:r>
-                              <a:rPr lang="en-US" b="0" i="1" smtClean="0">
-                                <a:latin typeface="Cambria Math"/>
-                              </a:rPr>
-                              <m:t>𝑛</m:t>
-                            </m:r>
-                            <m:r>
-                              <a:rPr lang="en-US" b="0" i="1" smtClean="0">
-                                <a:latin typeface="Cambria Math"/>
-                              </a:rPr>
-                              <m:t>−</m:t>
-                            </m:r>
-                            <m:r>
-                              <a:rPr lang="en-US" b="0" i="1" smtClean="0">
-                                <a:latin typeface="Cambria Math"/>
-                              </a:rPr>
-                              <m:t>𝑠</m:t>
-                            </m:r>
-                          </m:e>
-                        </m:d>
-                        <m:r>
-                          <a:rPr lang="en-US" b="0" i="1" smtClean="0">
-                            <a:latin typeface="Cambria Math"/>
-                          </a:rPr>
-                          <m:t>!</m:t>
-                        </m:r>
-                      </m:den>
-                    </m:f>
-                  </m:oMath>
-                </a14:m>
-                <a:r>
-                  <a:rPr lang="en-US" dirty="0" smtClean="0"/>
-                  <a:t> subsets to test where:</a:t>
-                </a:r>
-              </a:p>
-              <a:p>
-                <a:pPr lvl="2"/>
-                <a14:m>
-                  <m:oMath xmlns:m="http://schemas.openxmlformats.org/officeDocument/2006/math">
-                    <m:r>
-                      <a:rPr lang="en-US" b="0" i="1" smtClean="0">
-                        <a:latin typeface="Cambria Math"/>
-                      </a:rPr>
-                      <m:t>𝑛</m:t>
-                    </m:r>
-                  </m:oMath>
-                </a14:m>
-                <a:r>
-                  <a:rPr lang="en-US" dirty="0" smtClean="0"/>
-                  <a:t> is the number of </a:t>
-                </a:r>
-                <a:r>
-                  <a:rPr lang="en-US" dirty="0" err="1" smtClean="0"/>
-                  <a:t>datapoints</a:t>
-                </a:r>
-                <a:endParaRPr lang="en-US" dirty="0" smtClean="0"/>
-              </a:p>
-              <a:p>
-                <a:pPr lvl="2"/>
-                <a14:m>
-                  <m:oMath xmlns:m="http://schemas.openxmlformats.org/officeDocument/2006/math">
-                    <m:r>
-                      <a:rPr lang="en-US" b="0" i="1" smtClean="0">
-                        <a:latin typeface="Cambria Math"/>
-                      </a:rPr>
-                      <m:t>𝑠</m:t>
-                    </m:r>
-                  </m:oMath>
-                </a14:m>
-                <a:r>
-                  <a:rPr lang="en-US" dirty="0"/>
-                  <a:t> </a:t>
-                </a:r>
-                <a:r>
-                  <a:rPr lang="en-US" dirty="0" smtClean="0"/>
-                  <a:t>is the subset size</a:t>
-                </a:r>
-              </a:p>
-              <a:p>
-                <a:pPr lvl="1"/>
-                <a:r>
-                  <a:rPr lang="en-US" dirty="0" smtClean="0"/>
-                  <a:t>Impractical using </a:t>
-                </a:r>
-                <a:r>
-                  <a:rPr lang="en-US" dirty="0" err="1" smtClean="0"/>
-                  <a:t>MatLab</a:t>
-                </a:r>
-                <a:endParaRPr lang="en-US" dirty="0" smtClean="0"/>
-              </a:p>
-              <a:p>
-                <a:r>
-                  <a:rPr lang="en-US" dirty="0" smtClean="0"/>
-                  <a:t>Implemented </a:t>
-                </a:r>
-                <a:r>
-                  <a:rPr lang="en-US" i="1" dirty="0" smtClean="0"/>
-                  <a:t>k</a:t>
-                </a:r>
-                <a:r>
-                  <a:rPr lang="en-US" dirty="0" smtClean="0"/>
-                  <a:t>-fold</a:t>
-                </a:r>
-              </a:p>
-              <a:p>
-                <a:pPr lvl="1"/>
-                <a:r>
-                  <a:rPr lang="en-US" dirty="0" smtClean="0"/>
-                  <a:t>Results in </a:t>
-                </a:r>
-                <a:r>
-                  <a:rPr lang="en-US" i="1" dirty="0" smtClean="0"/>
-                  <a:t>k</a:t>
-                </a:r>
-                <a:r>
-                  <a:rPr lang="en-US" dirty="0" smtClean="0"/>
-                  <a:t> subsets</a:t>
-                </a:r>
-              </a:p>
-              <a:p>
-                <a:pPr lvl="1"/>
-                <a:r>
-                  <a:rPr lang="en-US" dirty="0" smtClean="0"/>
-                  <a:t>Subsets of size </a:t>
-                </a:r>
-                <a14:m>
-                  <m:oMath xmlns:m="http://schemas.openxmlformats.org/officeDocument/2006/math">
-                    <m:r>
-                      <m:rPr>
-                        <m:sty m:val="p"/>
-                      </m:rPr>
-                      <a:rPr lang="en-US" b="0" i="0" smtClean="0">
-                        <a:latin typeface="Cambria Math"/>
-                      </a:rPr>
-                      <m:t>s</m:t>
-                    </m:r>
-                    <m:r>
-                      <a:rPr lang="en-US" b="0" i="0" smtClean="0">
-                        <a:latin typeface="Cambria Math"/>
-                      </a:rPr>
-                      <m:t>=</m:t>
-                    </m:r>
-                    <m:f>
-                      <m:fPr>
-                        <m:ctrlPr>
-                          <a:rPr lang="en-US" i="1">
-                            <a:latin typeface="Cambria Math"/>
-                          </a:rPr>
-                        </m:ctrlPr>
-                      </m:fPr>
-                      <m:num>
-                        <m:r>
-                          <a:rPr lang="en-US" i="1">
-                            <a:latin typeface="Cambria Math"/>
-                          </a:rPr>
-                          <m:t>𝑛</m:t>
-                        </m:r>
-                      </m:num>
-                      <m:den>
-                        <m:r>
-                          <a:rPr lang="en-US" b="0" i="1" smtClean="0">
-                            <a:latin typeface="Cambria Math"/>
-                          </a:rPr>
-                          <m:t>𝑘</m:t>
-                        </m:r>
-                      </m:den>
-                    </m:f>
-                  </m:oMath>
-                </a14:m>
-                <a:r>
-                  <a:rPr lang="en-US" dirty="0"/>
-                  <a:t> </a:t>
-                </a:r>
-              </a:p>
-              <a:p>
-                <a:pPr lvl="1"/>
-                <a:endParaRPr lang="en-US" dirty="0" smtClean="0"/>
-              </a:p>
-              <a:p>
-                <a:pPr lvl="1"/>
-                <a:endParaRPr lang="en-US" dirty="0" smtClean="0"/>
-              </a:p>
-              <a:p>
-                <a:endParaRPr lang="en-US" dirty="0" smtClean="0"/>
-              </a:p>
-            </p:txBody>
-          </p:sp>
-        </mc:Choice>
-        <mc:Fallback xmlns="">
-          <p:sp>
-            <p:nvSpPr>
-              <p:cNvPr id="3" name="Content Placeholder 2"/>
-              <p:cNvSpPr>
-                <a:spLocks noGrp="1" noRot="1" noChangeAspect="1" noMove="1" noResize="1" noEditPoints="1" noAdjustHandles="1" noChangeArrowheads="1" noChangeShapeType="1" noTextEdit="1"/>
-              </p:cNvSpPr>
-              <p:nvPr>
-                <p:ph idx="1"/>
-              </p:nvPr>
-            </p:nvSpPr>
-            <p:spPr>
-              <a:blipFill rotWithShape="1">
-                <a:blip r:embed="rId2"/>
-                <a:stretch>
-                  <a:fillRect l="-888" t="-2369"/>
-                </a:stretch>
-              </a:blipFill>
-            </p:spPr>
-            <p:txBody>
-              <a:bodyPr/>
-              <a:lstStyle/>
-              <a:p>
-                <a:r>
-                  <a:rPr lang="en-US">
-                    <a:noFill/>
-                  </a:rPr>
-                  <a:t> </a:t>
-                </a:r>
-              </a:p>
-            </p:txBody>
-          </p:sp>
-        </mc:Fallback>
-      </mc:AlternateContent>
-    </p:spTree>
-    <p:extLst>
-      <p:ext uri="{BB962C8B-B14F-4D97-AF65-F5344CB8AC3E}">
-        <p14:creationId xmlns:p14="http://schemas.microsoft.com/office/powerpoint/2010/main" val="1194822123"/>
-      </p:ext>
-    </p:extLst>
-  </p:cSld>
-  <p:clrMapOvr>
-    <a:masterClrMapping/>
-  </p:clrMapOvr>
-  <p:timing>
-    <p:tnLst>
-      <p:par>
-        <p:cTn id="1" dur="indefinite" restart="never" nodeType="tmRoot"/>
-      </p:par>
-    </p:tnLst>
-  </p:timing>
-</p:sld>
-</file>
-
-<file path=ppt/slides/slide6.xml><?xml version="1.0" encoding="utf-8"?>
-<p:sld xmlns:a="http://schemas.openxmlformats.org/drawingml/2006/main" xmlns:r="http://schemas.openxmlformats.org/officeDocument/2006/relationships" xmlns:p="http://schemas.openxmlformats.org/presentationml/2006/main">
-  <p:cSld>
-    <p:spTree>
-      <p:nvGrpSpPr>
-        <p:cNvPr id="1" name=""/>
-        <p:cNvGrpSpPr/>
-        <p:nvPr/>
-      </p:nvGrpSpPr>
-      <p:grpSpPr>
-        <a:xfrm>
-          <a:off x="0" y="0"/>
-          <a:ext cx="0" cy="0"/>
-          <a:chOff x="0" y="0"/>
-          <a:chExt cx="0" cy="0"/>
-        </a:xfrm>
-      </p:grpSpPr>
-      <p:sp>
-        <p:nvSpPr>
-          <p:cNvPr id="2" name="Title 1"/>
-          <p:cNvSpPr>
-            <a:spLocks noGrp="1"/>
-          </p:cNvSpPr>
-          <p:nvPr>
-            <p:ph type="title"/>
-          </p:nvPr>
-        </p:nvSpPr>
-        <p:spPr/>
-        <p:txBody>
-          <a:bodyPr/>
-          <a:lstStyle/>
-          <a:p>
-            <a:r>
-              <a:rPr lang="en-US" dirty="0" smtClean="0"/>
-              <a:t>K-Means Clustering</a:t>
-            </a:r>
-            <a:endParaRPr lang="en-US" dirty="0"/>
-          </a:p>
-        </p:txBody>
-      </p:sp>
-      <mc:AlternateContent xmlns:mc="http://schemas.openxmlformats.org/markup-compatibility/2006">
-        <mc:Choice xmlns:a14="http://schemas.microsoft.com/office/drawing/2010/main" Requires="a14">
           <p:sp>
             <p:nvSpPr>
               <p:cNvPr id="3" name="Content Placeholder 2"/>
@@ -8905,20 +8502,16 @@
               <a:lstStyle/>
               <a:p>
                 <a:r>
-                  <a:rPr lang="en-US" dirty="0" smtClean="0"/>
+                  <a:rPr lang="en-US" dirty="0"/>
                   <a:t>Group data points into </a:t>
                 </a:r>
                 <a:r>
-                  <a:rPr lang="en-US" i="1" dirty="0" smtClean="0"/>
+                  <a:rPr lang="en-US" i="1" dirty="0"/>
                   <a:t>k</a:t>
                 </a:r>
                 <a:r>
                   <a:rPr lang="en-US" dirty="0"/>
-                  <a:t> </a:t>
-                </a:r>
-                <a:r>
-                  <a:rPr lang="en-US" dirty="0" smtClean="0"/>
-                  <a:t>groups such that</a:t>
+                  <a:t> groups such that</a:t>
                 </a:r>
               </a:p>
               <a:p>
@@ -8936,7 +8529,7 @@
                           <m:chr m:val="∑"/>
                           <m:ctrlPr>
                             <a:rPr lang="en-US" i="1">
-                              <a:latin typeface="Cambria Math"/>
+                              <a:latin typeface="Cambria Math" panose="02040503050406030204" pitchFamily="18" charset="0"/>
                             </a:rPr>
                           </m:ctrlPr>
                         </m:naryPr>
@@ -8972,7 +8565,7 @@
                               <m:supHide m:val="on"/>
                               <m:ctrlPr>
                                 <a:rPr lang="en-US" i="1">
-                                  <a:latin typeface="Cambria Math"/>
+                                  <a:latin typeface="Cambria Math" panose="02040503050406030204" pitchFamily="18" charset="0"/>
                                 </a:rPr>
                               </m:ctrlPr>
                             </m:naryPr>
@@ -9000,7 +8593,7 @@
                                 <m:sSubPr>
                                   <m:ctrlPr>
                                     <a:rPr lang="en-US" b="1" i="1" smtClean="0">
-                                      <a:latin typeface="Cambria Math"/>
+                                      <a:latin typeface="Cambria Math" panose="02040503050406030204" pitchFamily="18" charset="0"/>
                                       <a:ea typeface="Cambria Math"/>
                                     </a:rPr>
                                   </m:ctrlPr>
@@ -9031,7 +8624,7 @@
                                 <m:sSupPr>
                                   <m:ctrlPr>
                                     <a:rPr lang="en-US" b="0" i="1" smtClean="0">
-                                      <a:latin typeface="Cambria Math"/>
+                                      <a:latin typeface="Cambria Math" panose="02040503050406030204" pitchFamily="18" charset="0"/>
                                       <a:ea typeface="Cambria Math"/>
                                     </a:rPr>
                                   </m:ctrlPr>
@@ -9060,7 +8653,7 @@
                                     <m:sSubPr>
                                       <m:ctrlPr>
                                         <a:rPr lang="en-US" i="1">
-                                          <a:latin typeface="Cambria Math"/>
+                                          <a:latin typeface="Cambria Math" panose="02040503050406030204" pitchFamily="18" charset="0"/>
                                           <a:ea typeface="Cambria Math"/>
                                         </a:rPr>
                                       </m:ctrlPr>
@@ -9109,7 +8702,7 @@
                     </m:oMath>
                   </m:oMathPara>
                 </a14:m>
-                <a:endParaRPr lang="en-US" dirty="0" smtClean="0"/>
+                <a:endParaRPr lang="en-US" dirty="0"/>
               </a:p>
               <a:p>
                 <a:pPr marL="0" indent="0">
@@ -9117,69 +8710,65 @@
                 </a:pPr>
                 <a:r>
                   <a:rPr lang="en-US" dirty="0"/>
-                  <a:t> </a:t>
-                </a:r>
-                <a:r>
-                  <a:rPr lang="en-US" dirty="0" smtClean="0"/>
-                  <a:t>   is minimized	</a:t>
+                  <a:t>    is minimized	</a:t>
                 </a:r>
               </a:p>
               <a:p>
                 <a:r>
-                  <a:rPr lang="en-US" dirty="0" err="1" smtClean="0"/>
+                  <a:rPr lang="en-US" dirty="0" err="1"/>
                   <a:t>MatLab</a:t>
                 </a:r>
                 <a:r>
-                  <a:rPr lang="en-US" dirty="0" smtClean="0"/>
+                  <a:rPr lang="en-US" dirty="0"/>
                   <a:t> syntax:</a:t>
                 </a:r>
               </a:p>
               <a:p>
                 <a:pPr lvl="1"/>
                 <a:r>
-                  <a:rPr lang="en-US" dirty="0" smtClean="0">
+                  <a:rPr lang="en-US" dirty="0">
                     <a:latin typeface="Miriam Fixed" panose="020B0509050101010101" pitchFamily="49" charset="-79"/>
                     <a:cs typeface="Miriam Fixed" panose="020B0509050101010101" pitchFamily="49" charset="-79"/>
                   </a:rPr>
                   <a:t>[</a:t>
                 </a:r>
                 <a:r>
-                  <a:rPr lang="en-US" dirty="0" err="1" smtClean="0">
+                  <a:rPr lang="en-US" dirty="0" err="1">
                     <a:latin typeface="Miriam Fixed" panose="020B0509050101010101" pitchFamily="49" charset="-79"/>
                     <a:cs typeface="Miriam Fixed" panose="020B0509050101010101" pitchFamily="49" charset="-79"/>
                   </a:rPr>
                   <a:t>cluster_label,mean</a:t>
                 </a:r>
                 <a:r>
-                  <a:rPr lang="en-US" dirty="0" smtClean="0">
+                  <a:rPr lang="en-US" dirty="0">
                     <a:latin typeface="Miriam Fixed" panose="020B0509050101010101" pitchFamily="49" charset="-79"/>
                     <a:cs typeface="Miriam Fixed" panose="020B0509050101010101" pitchFamily="49" charset="-79"/>
                   </a:rPr>
                   <a:t>] = </a:t>
                 </a:r>
                 <a:r>
-                  <a:rPr lang="en-US" dirty="0" err="1" smtClean="0">
+                  <a:rPr lang="en-US" dirty="0" err="1">
                     <a:latin typeface="Miriam Fixed" panose="020B0509050101010101" pitchFamily="49" charset="-79"/>
                     <a:cs typeface="Miriam Fixed" panose="020B0509050101010101" pitchFamily="49" charset="-79"/>
                   </a:rPr>
                   <a:t>kmeans</a:t>
                 </a:r>
                 <a:r>
-                  <a:rPr lang="en-US" dirty="0" smtClean="0">
+                  <a:rPr lang="en-US" dirty="0">
                     <a:latin typeface="Miriam Fixed" panose="020B0509050101010101" pitchFamily="49" charset="-79"/>
                     <a:cs typeface="Miriam Fixed" panose="020B0509050101010101" pitchFamily="49" charset="-79"/>
                   </a:rPr>
                   <a:t>([</a:t>
                 </a:r>
                 <a:r>
-                  <a:rPr lang="en-US" dirty="0" err="1" smtClean="0">
+                  <a:rPr lang="en-US" dirty="0" err="1">
                     <a:latin typeface="Miriam Fixed" panose="020B0509050101010101" pitchFamily="49" charset="-79"/>
                     <a:cs typeface="Miriam Fixed" panose="020B0509050101010101" pitchFamily="49" charset="-79"/>
                   </a:rPr>
                   <a:t>data_points</a:t>
                 </a:r>
                 <a:r>
-                  <a:rPr lang="en-US" dirty="0" smtClean="0">
+                  <a:rPr lang="en-US" dirty="0">
                     <a:latin typeface="Miriam Fixed" panose="020B0509050101010101" pitchFamily="49" charset="-79"/>
                     <a:cs typeface="Miriam Fixed" panose="020B0509050101010101" pitchFamily="49" charset="-79"/>
                   </a:rPr>
@@ -9189,75 +8778,59 @@
               <a:p>
                 <a:pPr lvl="1"/>
                 <a:r>
-                  <a:rPr lang="en-US" dirty="0" smtClean="0"/>
+                  <a:rPr lang="en-US" dirty="0"/>
                   <a:t>Only uses raw data-points, and  number of clusters as inputs</a:t>
                 </a:r>
               </a:p>
               <a:p>
                 <a:pPr lvl="1"/>
                 <a:r>
-                  <a:rPr lang="en-US" dirty="0" smtClean="0"/>
+                  <a:rPr lang="en-US" dirty="0"/>
                   <a:t>No labels used as inputs, so outputted labels would not match actual class labels</a:t>
                 </a:r>
-                <a:endParaRPr lang="en-US" dirty="0" smtClean="0"/>
               </a:p>
               <a:p>
                 <a:r>
-                  <a:rPr lang="en-US" dirty="0" smtClean="0"/>
+                  <a:rPr lang="en-US" dirty="0"/>
                   <a:t>Confusion Matrix</a:t>
-                </a:r>
-                <a:endParaRPr lang="en-US" dirty="0" smtClean="0"/>
-              </a:p>
-              <a:p>
-                <a:pPr lvl="1"/>
-                <a:r>
-                  <a:rPr lang="en-US" dirty="0" smtClean="0"/>
-                  <a:t>Matches predicted labels (mentioned above) with actual class labels</a:t>
-                </a:r>
-                <a:endParaRPr lang="en-US" dirty="0" smtClean="0"/>
-              </a:p>
-              <a:p>
-                <a:pPr lvl="1"/>
-                <a:r>
-                  <a:rPr lang="en-US" dirty="0" smtClean="0"/>
-                  <a:t>Does this by rearranging columns into </a:t>
-                </a:r>
-                <a:r>
-                  <a:rPr lang="en-US" dirty="0" smtClean="0"/>
-                  <a:t>a sparse </a:t>
-                </a:r>
-                <a:r>
-                  <a:rPr lang="en-US" dirty="0" smtClean="0"/>
-                  <a:t>matrix</a:t>
                 </a:r>
               </a:p>
               <a:p>
                 <a:pPr lvl="1"/>
                 <a:r>
-                  <a:rPr lang="en-US" dirty="0" smtClean="0"/>
-                  <a:t>Done </a:t>
+                  <a:rPr lang="en-US" dirty="0"/>
+                  <a:t>Matches predicted labels (mentioned above) with actual class labels</a:t>
                 </a:r>
+              </a:p>
+              <a:p>
+                <a:pPr lvl="1"/>
                 <a:r>
-                  <a:rPr lang="en-US" dirty="0" smtClean="0"/>
-                  <a:t>via Hungarian-method or Bi-partite matching</a:t>
+                  <a:rPr lang="en-US" dirty="0"/>
+                  <a:t>Does this by rearranging columns into a sparse matrix</a:t>
                 </a:r>
+              </a:p>
+              <a:p>
+                <a:pPr lvl="1"/>
+                <a:r>
+                  <a:rPr lang="en-US" dirty="0"/>
+                  <a:t>Done via Hungarian-method or Bi-partite matching</a:t>
+                </a:r>
+              </a:p>
+              <a:p>
+                <a:pPr lvl="1"/>
                 <a:endParaRPr lang="en-US" dirty="0"/>
               </a:p>
               <a:p>
                 <a:pPr lvl="1"/>
-                <a:endParaRPr lang="en-US" dirty="0" smtClean="0"/>
+                <a:endParaRPr lang="en-US" dirty="0"/>
               </a:p>
               <a:p>
-                <a:pPr lvl="1"/>
-                <a:endParaRPr lang="en-US" dirty="0" smtClean="0"/>
-              </a:p>
-              <a:p>
-                <a:endParaRPr lang="en-US" dirty="0" smtClean="0"/>
+                <a:endParaRPr lang="en-US" dirty="0"/>
               </a:p>
             </p:txBody>
           </p:sp>
         </mc:Choice>
-        <mc:Fallback>
+        <mc:Fallback xmlns="">
           <p:sp>
             <p:nvSpPr>
               <p:cNvPr id="3" name="Content Placeholder 2"/>
@@ -9301,17 +8874,10 @@
   <p:clrMapOvr>
     <a:masterClrMapping/>
   </p:clrMapOvr>
-  <p:timing>
-    <p:tnLst>
-      <p:par>
-        <p:cTn id="1" dur="indefinite" restart="never" nodeType="tmRoot"/>
-      </p:par>
-    </p:tnLst>
-  </p:timing>
 </p:sld>
 </file>
 
-<file path=ppt/slides/slide7.xml><?xml version="1.0" encoding="utf-8"?>
+<file path=ppt/slides/slide6.xml><?xml version="1.0" encoding="utf-8"?>
 <p:sld xmlns:a="http://schemas.openxmlformats.org/drawingml/2006/main" xmlns:r="http://schemas.openxmlformats.org/officeDocument/2006/relationships" xmlns:p="http://schemas.openxmlformats.org/presentationml/2006/main">
   <p:cSld>
     <p:spTree>
@@ -9344,10 +8910,9 @@
           <a:lstStyle/>
           <a:p>
             <a:r>
-              <a:rPr lang="en-US" dirty="0" smtClean="0"/>
+              <a:rPr lang="en-US" dirty="0"/>
               <a:t>Faces - Confusion Matrix / Sparse Matrix</a:t>
             </a:r>
-            <a:endParaRPr lang="en-US" dirty="0"/>
           </a:p>
         </p:txBody>
       </p:sp>
@@ -9369,70 +8934,68 @@
           <a:lstStyle/>
           <a:p>
             <a:r>
-              <a:rPr lang="en-US" dirty="0" smtClean="0"/>
+              <a:rPr lang="en-US" dirty="0"/>
               <a:t>Faces</a:t>
             </a:r>
           </a:p>
           <a:p>
             <a:pPr lvl="1"/>
             <a:r>
-              <a:rPr lang="en-US" dirty="0" smtClean="0"/>
+              <a:rPr lang="en-US" dirty="0"/>
               <a:t>40 classes</a:t>
             </a:r>
           </a:p>
           <a:p>
             <a:pPr lvl="1"/>
             <a:r>
-              <a:rPr lang="en-US" dirty="0" smtClean="0"/>
+              <a:rPr lang="en-US" dirty="0"/>
               <a:t>10 images per class</a:t>
             </a:r>
           </a:p>
           <a:p>
             <a:pPr lvl="1"/>
             <a:r>
-              <a:rPr lang="en-US" dirty="0" smtClean="0"/>
+              <a:rPr lang="en-US" dirty="0"/>
               <a:t>400 images total</a:t>
             </a:r>
           </a:p>
           <a:p>
             <a:r>
-              <a:rPr lang="en-US" dirty="0" smtClean="0"/>
+              <a:rPr lang="en-US" dirty="0"/>
               <a:t>Images</a:t>
             </a:r>
           </a:p>
           <a:p>
             <a:pPr lvl="1"/>
             <a:r>
-              <a:rPr lang="en-US" dirty="0" smtClean="0"/>
+              <a:rPr lang="en-US" dirty="0"/>
               <a:t>Width of 23 pixels</a:t>
             </a:r>
           </a:p>
           <a:p>
             <a:pPr lvl="1"/>
             <a:r>
-              <a:rPr lang="en-US" dirty="0" smtClean="0"/>
+              <a:rPr lang="en-US" dirty="0"/>
               <a:t>Height of 28 pixels</a:t>
             </a:r>
-            <a:endParaRPr lang="en-US" dirty="0"/>
-          </a:p>
-          <a:p>
-            <a:r>
-              <a:rPr lang="en-US" dirty="0" smtClean="0"/>
+          </a:p>
+          <a:p>
+            <a:r>
+              <a:rPr lang="en-US" dirty="0"/>
               <a:t>Classification</a:t>
             </a:r>
-            <a:endParaRPr lang="en-US" dirty="0"/>
           </a:p>
           <a:p>
             <a:pPr lvl="1"/>
             <a:r>
-              <a:rPr lang="en-US" dirty="0" smtClean="0"/>
+              <a:rPr lang="en-US" dirty="0"/>
               <a:t># correct: 233 - 293</a:t>
             </a:r>
           </a:p>
           <a:p>
             <a:pPr lvl="1"/>
             <a:r>
-              <a:rPr lang="en-US" dirty="0" smtClean="0"/>
+              <a:rPr lang="en-US" dirty="0"/>
               <a:t>% correct: 58% - 73%</a:t>
             </a:r>
           </a:p>
@@ -9556,17 +9119,10 @@
   <p:clrMapOvr>
     <a:masterClrMapping/>
   </p:clrMapOvr>
-  <p:timing>
-    <p:tnLst>
-      <p:par>
-        <p:cTn id="1" dur="indefinite" restart="never" nodeType="tmRoot"/>
-      </p:par>
-    </p:tnLst>
-  </p:timing>
 </p:sld>
 </file>
 
-<file path=ppt/slides/slide8.xml><?xml version="1.0" encoding="utf-8"?>
+<file path=ppt/slides/slide7.xml><?xml version="1.0" encoding="utf-8"?>
 <p:sld xmlns:a="http://schemas.openxmlformats.org/drawingml/2006/main" xmlns:r="http://schemas.openxmlformats.org/officeDocument/2006/relationships" xmlns:p="http://schemas.openxmlformats.org/presentationml/2006/main">
   <p:cSld>
     <p:spTree>
@@ -9599,10 +9155,9 @@
           <a:lstStyle/>
           <a:p>
             <a:r>
-              <a:rPr lang="en-US" dirty="0" smtClean="0"/>
+              <a:rPr lang="en-US" dirty="0"/>
               <a:t>Letters - Confusion Matrix / Sparse Matrix</a:t>
             </a:r>
-            <a:endParaRPr lang="en-US" dirty="0"/>
           </a:p>
         </p:txBody>
       </p:sp>
@@ -9624,70 +9179,68 @@
           <a:lstStyle/>
           <a:p>
             <a:r>
-              <a:rPr lang="en-US" dirty="0" smtClean="0"/>
+              <a:rPr lang="en-US" dirty="0"/>
               <a:t>Letters</a:t>
             </a:r>
           </a:p>
           <a:p>
             <a:pPr lvl="1"/>
             <a:r>
-              <a:rPr lang="en-US" dirty="0" smtClean="0"/>
+              <a:rPr lang="en-US" dirty="0"/>
               <a:t>26 classes</a:t>
             </a:r>
           </a:p>
           <a:p>
             <a:pPr lvl="1"/>
             <a:r>
-              <a:rPr lang="en-US" dirty="0" smtClean="0"/>
+              <a:rPr lang="en-US" dirty="0"/>
               <a:t>39 images per class</a:t>
             </a:r>
           </a:p>
           <a:p>
             <a:pPr lvl="1"/>
             <a:r>
-              <a:rPr lang="en-US" dirty="0" smtClean="0"/>
+              <a:rPr lang="en-US" dirty="0"/>
               <a:t>1,014 images total</a:t>
             </a:r>
           </a:p>
           <a:p>
             <a:r>
-              <a:rPr lang="en-US" dirty="0" smtClean="0"/>
+              <a:rPr lang="en-US" dirty="0"/>
               <a:t>Images</a:t>
             </a:r>
           </a:p>
           <a:p>
             <a:pPr lvl="1"/>
             <a:r>
-              <a:rPr lang="en-US" dirty="0" smtClean="0"/>
+              <a:rPr lang="en-US" dirty="0"/>
               <a:t>Width of 16 pixels</a:t>
             </a:r>
           </a:p>
           <a:p>
             <a:pPr lvl="1"/>
             <a:r>
-              <a:rPr lang="en-US" dirty="0" smtClean="0"/>
+              <a:rPr lang="en-US" dirty="0"/>
               <a:t>Height of 20 pixels</a:t>
             </a:r>
-            <a:endParaRPr lang="en-US" dirty="0"/>
-          </a:p>
-          <a:p>
-            <a:r>
-              <a:rPr lang="en-US" dirty="0" smtClean="0"/>
+          </a:p>
+          <a:p>
+            <a:r>
+              <a:rPr lang="en-US" dirty="0"/>
               <a:t>Classification</a:t>
             </a:r>
-            <a:endParaRPr lang="en-US" dirty="0"/>
           </a:p>
           <a:p>
             <a:pPr lvl="1"/>
             <a:r>
-              <a:rPr lang="en-US" dirty="0" smtClean="0"/>
+              <a:rPr lang="en-US" dirty="0"/>
               <a:t># correct: 464 - 519</a:t>
             </a:r>
           </a:p>
           <a:p>
             <a:pPr lvl="1"/>
             <a:r>
-              <a:rPr lang="en-US" dirty="0" smtClean="0"/>
+              <a:rPr lang="en-US" dirty="0"/>
               <a:t>% correct: 46% - 52%</a:t>
             </a:r>
           </a:p>
@@ -9811,13 +9364,129 @@
   <p:clrMapOvr>
     <a:masterClrMapping/>
   </p:clrMapOvr>
-  <p:timing>
-    <p:tnLst>
-      <p:par>
-        <p:cTn id="1" dur="indefinite" restart="never" nodeType="tmRoot"/>
-      </p:par>
-    </p:tnLst>
-  </p:timing>
+</p:sld>
+</file>
+
+<file path=ppt/slides/slide8.xml><?xml version="1.0" encoding="utf-8"?>
+<p:sld xmlns:a="http://schemas.openxmlformats.org/drawingml/2006/main" xmlns:r="http://schemas.openxmlformats.org/officeDocument/2006/relationships" xmlns:p="http://schemas.openxmlformats.org/presentationml/2006/main">
+  <p:cSld>
+    <p:spTree>
+      <p:nvGrpSpPr>
+        <p:cNvPr id="1" name=""/>
+        <p:cNvGrpSpPr/>
+        <p:nvPr/>
+      </p:nvGrpSpPr>
+      <p:grpSpPr>
+        <a:xfrm>
+          <a:off x="0" y="0"/>
+          <a:ext cx="0" cy="0"/>
+          <a:chOff x="0" y="0"/>
+          <a:chExt cx="0" cy="0"/>
+        </a:xfrm>
+      </p:grpSpPr>
+      <p:sp>
+        <p:nvSpPr>
+          <p:cNvPr id="2" name="Title 1"/>
+          <p:cNvSpPr>
+            <a:spLocks noGrp="1"/>
+          </p:cNvSpPr>
+          <p:nvPr>
+            <p:ph type="title"/>
+          </p:nvPr>
+        </p:nvSpPr>
+        <p:spPr/>
+        <p:txBody>
+          <a:bodyPr/>
+          <a:lstStyle/>
+          <a:p>
+            <a:r>
+              <a:rPr lang="en-US" dirty="0"/>
+              <a:t>Support Vector Machine</a:t>
+            </a:r>
+          </a:p>
+        </p:txBody>
+      </p:sp>
+      <p:sp>
+        <p:nvSpPr>
+          <p:cNvPr id="3" name="Content Placeholder 2"/>
+          <p:cNvSpPr>
+            <a:spLocks noGrp="1"/>
+          </p:cNvSpPr>
+          <p:nvPr>
+            <p:ph idx="1"/>
+          </p:nvPr>
+        </p:nvSpPr>
+        <p:spPr/>
+        <p:txBody>
+          <a:bodyPr/>
+          <a:lstStyle/>
+          <a:p>
+            <a:r>
+              <a:rPr lang="en-US" dirty="0"/>
+              <a:t>Kernels</a:t>
+            </a:r>
+          </a:p>
+          <a:p>
+            <a:pPr lvl="1"/>
+            <a:r>
+              <a:rPr lang="en-US" dirty="0"/>
+              <a:t>Linear – maps data on a 2 dimensional plane</a:t>
+            </a:r>
+          </a:p>
+          <a:p>
+            <a:pPr lvl="1"/>
+            <a:r>
+              <a:rPr lang="en-US" dirty="0"/>
+              <a:t>Gaussian – maps data on a 3 dimensional plane</a:t>
+            </a:r>
+          </a:p>
+          <a:p>
+            <a:pPr lvl="1"/>
+            <a:endParaRPr lang="en-US" dirty="0"/>
+          </a:p>
+          <a:p>
+            <a:r>
+              <a:rPr lang="en-US" dirty="0"/>
+              <a:t>Results</a:t>
+            </a:r>
+          </a:p>
+          <a:p>
+            <a:pPr lvl="1"/>
+            <a:r>
+              <a:rPr lang="en-US" dirty="0"/>
+              <a:t>SVM correct labeling – </a:t>
+            </a:r>
+          </a:p>
+          <a:p>
+            <a:pPr lvl="2"/>
+            <a:r>
+              <a:rPr lang="en-US" dirty="0"/>
+              <a:t>50 dataset – 80% correct (Assignment 1 Data)</a:t>
+            </a:r>
+          </a:p>
+          <a:p>
+            <a:pPr lvl="2"/>
+            <a:r>
+              <a:rPr lang="en-US" dirty="0"/>
+              <a:t>200 dataset - 95% (Assignment 1 Data)</a:t>
+            </a:r>
+          </a:p>
+          <a:p>
+            <a:pPr lvl="1"/>
+            <a:endParaRPr lang="en-US" dirty="0"/>
+          </a:p>
+        </p:txBody>
+      </p:sp>
+    </p:spTree>
+    <p:extLst>
+      <p:ext uri="{BB962C8B-B14F-4D97-AF65-F5344CB8AC3E}">
+        <p14:creationId xmlns:p14="http://schemas.microsoft.com/office/powerpoint/2010/main" val="1764275509"/>
+      </p:ext>
+    </p:extLst>
+  </p:cSld>
+  <p:clrMapOvr>
+    <a:masterClrMapping/>
+  </p:clrMapOvr>
 </p:sld>
 </file>
 
@@ -10069,7 +9738,7 @@
   <a:extraClrSchemeLst/>
   <a:extLst>
     <a:ext uri="{05A4C25C-085E-4340-85A3-A5531E510DB2}">
-      <thm15:themeFamily xmlns="" xmlns:thm15="http://schemas.microsoft.com/office/thememl/2012/main" name="Berlin" id="{7B5DBA9E-B069-418E-9360-A61BDD0615A4}" vid="{C0CBE056-4EF4-4D92-969E-947779DA7AAA}"/>
+      <thm15:themeFamily xmlns:thm15="http://schemas.microsoft.com/office/thememl/2012/main" name="Berlin" id="{7B5DBA9E-B069-418E-9360-A61BDD0615A4}" vid="{C0CBE056-4EF4-4D92-969E-947779DA7AAA}"/>
     </a:ext>
   </a:extLst>
 </a:theme>

</xml_diff>